<commit_message>
chore(zip): add cleanup-param; protect slideLayout-images from cleanup deletion
</commit_message>
<xml_diff>
--- a/__tests__/pptx-templates/RootTemplateWithImages.pptx
+++ b/__tests__/pptx-templates/RootTemplateWithImages.pptx
@@ -259,7 +259,7 @@
           <a:p>
             <a:fld id="{8FB60A0F-5ED1-45ED-A5D5-DB038E6B70D9}" type="datetimeFigureOut">
               <a:rPr lang="de-DE" smtClean="0"/>
-              <a:t>12.01.2023</a:t>
+              <a:t>13.01.2023</a:t>
             </a:fld>
             <a:endParaRPr lang="de-DE"/>
           </a:p>
@@ -319,6 +319,42 @@
           </a:p>
         </p:txBody>
       </p:sp>
+      <p:pic>
+        <p:nvPicPr>
+          <p:cNvPr id="8" name="Grafik 7">
+            <a:extLst>
+              <a:ext uri="{FF2B5EF4-FFF2-40B4-BE49-F238E27FC236}">
+                <a16:creationId xmlns:a16="http://schemas.microsoft.com/office/drawing/2014/main" id="{6FBE81F3-6B55-4924-B31A-226C20B179F6}"/>
+              </a:ext>
+            </a:extLst>
+          </p:cNvPr>
+          <p:cNvPicPr>
+            <a:picLocks noChangeAspect="1"/>
+          </p:cNvPicPr>
+          <p:nvPr userDrawn="1"/>
+        </p:nvPicPr>
+        <p:blipFill>
+          <a:blip r:embed="rId2">
+            <a:extLst>
+              <a:ext uri="{28A0092B-C50C-407E-A947-70E740481C1C}">
+                <a14:useLocalDpi xmlns:a14="http://schemas.microsoft.com/office/drawing/2010/main" val="0"/>
+              </a:ext>
+            </a:extLst>
+          </a:blip>
+          <a:stretch>
+            <a:fillRect/>
+          </a:stretch>
+        </p:blipFill>
+        <p:spPr>
+          <a:xfrm>
+            <a:off x="10529887" y="9525"/>
+            <a:ext cx="1647825" cy="6838950"/>
+          </a:xfrm>
+          <a:prstGeom prst="rect">
+            <a:avLst/>
+          </a:prstGeom>
+        </p:spPr>
+      </p:pic>
     </p:spTree>
     <p:extLst>
       <p:ext uri="{BB962C8B-B14F-4D97-AF65-F5344CB8AC3E}">
@@ -457,7 +493,7 @@
           <a:p>
             <a:fld id="{8FB60A0F-5ED1-45ED-A5D5-DB038E6B70D9}" type="datetimeFigureOut">
               <a:rPr lang="de-DE" smtClean="0"/>
-              <a:t>12.01.2023</a:t>
+              <a:t>13.01.2023</a:t>
             </a:fld>
             <a:endParaRPr lang="de-DE"/>
           </a:p>
@@ -665,7 +701,7 @@
           <a:p>
             <a:fld id="{8FB60A0F-5ED1-45ED-A5D5-DB038E6B70D9}" type="datetimeFigureOut">
               <a:rPr lang="de-DE" smtClean="0"/>
-              <a:t>12.01.2023</a:t>
+              <a:t>13.01.2023</a:t>
             </a:fld>
             <a:endParaRPr lang="de-DE"/>
           </a:p>
@@ -863,7 +899,7 @@
           <a:p>
             <a:fld id="{8FB60A0F-5ED1-45ED-A5D5-DB038E6B70D9}" type="datetimeFigureOut">
               <a:rPr lang="de-DE" smtClean="0"/>
-              <a:t>12.01.2023</a:t>
+              <a:t>13.01.2023</a:t>
             </a:fld>
             <a:endParaRPr lang="de-DE"/>
           </a:p>
@@ -1138,7 +1174,7 @@
           <a:p>
             <a:fld id="{8FB60A0F-5ED1-45ED-A5D5-DB038E6B70D9}" type="datetimeFigureOut">
               <a:rPr lang="de-DE" smtClean="0"/>
-              <a:t>12.01.2023</a:t>
+              <a:t>13.01.2023</a:t>
             </a:fld>
             <a:endParaRPr lang="de-DE"/>
           </a:p>
@@ -1403,7 +1439,7 @@
           <a:p>
             <a:fld id="{8FB60A0F-5ED1-45ED-A5D5-DB038E6B70D9}" type="datetimeFigureOut">
               <a:rPr lang="de-DE" smtClean="0"/>
-              <a:t>12.01.2023</a:t>
+              <a:t>13.01.2023</a:t>
             </a:fld>
             <a:endParaRPr lang="de-DE"/>
           </a:p>
@@ -1815,7 +1851,7 @@
           <a:p>
             <a:fld id="{8FB60A0F-5ED1-45ED-A5D5-DB038E6B70D9}" type="datetimeFigureOut">
               <a:rPr lang="de-DE" smtClean="0"/>
-              <a:t>12.01.2023</a:t>
+              <a:t>13.01.2023</a:t>
             </a:fld>
             <a:endParaRPr lang="de-DE"/>
           </a:p>
@@ -1956,7 +1992,7 @@
           <a:p>
             <a:fld id="{8FB60A0F-5ED1-45ED-A5D5-DB038E6B70D9}" type="datetimeFigureOut">
               <a:rPr lang="de-DE" smtClean="0"/>
-              <a:t>12.01.2023</a:t>
+              <a:t>13.01.2023</a:t>
             </a:fld>
             <a:endParaRPr lang="de-DE"/>
           </a:p>
@@ -2069,7 +2105,7 @@
           <a:p>
             <a:fld id="{8FB60A0F-5ED1-45ED-A5D5-DB038E6B70D9}" type="datetimeFigureOut">
               <a:rPr lang="de-DE" smtClean="0"/>
-              <a:t>12.01.2023</a:t>
+              <a:t>13.01.2023</a:t>
             </a:fld>
             <a:endParaRPr lang="de-DE"/>
           </a:p>
@@ -2380,7 +2416,7 @@
           <a:p>
             <a:fld id="{8FB60A0F-5ED1-45ED-A5D5-DB038E6B70D9}" type="datetimeFigureOut">
               <a:rPr lang="de-DE" smtClean="0"/>
-              <a:t>12.01.2023</a:t>
+              <a:t>13.01.2023</a:t>
             </a:fld>
             <a:endParaRPr lang="de-DE"/>
           </a:p>
@@ -2668,7 +2704,7 @@
           <a:p>
             <a:fld id="{8FB60A0F-5ED1-45ED-A5D5-DB038E6B70D9}" type="datetimeFigureOut">
               <a:rPr lang="de-DE" smtClean="0"/>
-              <a:t>12.01.2023</a:t>
+              <a:t>13.01.2023</a:t>
             </a:fld>
             <a:endParaRPr lang="de-DE"/>
           </a:p>
@@ -2909,7 +2945,7 @@
           <a:p>
             <a:fld id="{8FB60A0F-5ED1-45ED-A5D5-DB038E6B70D9}" type="datetimeFigureOut">
               <a:rPr lang="de-DE" smtClean="0"/>
-              <a:t>12.01.2023</a:t>
+              <a:t>13.01.2023</a:t>
             </a:fld>
             <a:endParaRPr lang="de-DE"/>
           </a:p>

</xml_diff>

<commit_message>
fix(master): use correct rels path on swapping image on slideMaster
</commit_message>
<xml_diff>
--- a/__tests__/pptx-templates/RootTemplateWithImages.pptx
+++ b/__tests__/pptx-templates/RootTemplateWithImages.pptx
@@ -259,7 +259,7 @@
           <a:p>
             <a:fld id="{8FB60A0F-5ED1-45ED-A5D5-DB038E6B70D9}" type="datetimeFigureOut">
               <a:rPr lang="de-DE" smtClean="0"/>
-              <a:t>13.01.2023</a:t>
+              <a:t>05.02.2024</a:t>
             </a:fld>
             <a:endParaRPr lang="de-DE"/>
           </a:p>
@@ -493,7 +493,7 @@
           <a:p>
             <a:fld id="{8FB60A0F-5ED1-45ED-A5D5-DB038E6B70D9}" type="datetimeFigureOut">
               <a:rPr lang="de-DE" smtClean="0"/>
-              <a:t>13.01.2023</a:t>
+              <a:t>05.02.2024</a:t>
             </a:fld>
             <a:endParaRPr lang="de-DE"/>
           </a:p>
@@ -701,7 +701,7 @@
           <a:p>
             <a:fld id="{8FB60A0F-5ED1-45ED-A5D5-DB038E6B70D9}" type="datetimeFigureOut">
               <a:rPr lang="de-DE" smtClean="0"/>
-              <a:t>13.01.2023</a:t>
+              <a:t>05.02.2024</a:t>
             </a:fld>
             <a:endParaRPr lang="de-DE"/>
           </a:p>
@@ -899,7 +899,7 @@
           <a:p>
             <a:fld id="{8FB60A0F-5ED1-45ED-A5D5-DB038E6B70D9}" type="datetimeFigureOut">
               <a:rPr lang="de-DE" smtClean="0"/>
-              <a:t>13.01.2023</a:t>
+              <a:t>05.02.2024</a:t>
             </a:fld>
             <a:endParaRPr lang="de-DE"/>
           </a:p>
@@ -1174,7 +1174,7 @@
           <a:p>
             <a:fld id="{8FB60A0F-5ED1-45ED-A5D5-DB038E6B70D9}" type="datetimeFigureOut">
               <a:rPr lang="de-DE" smtClean="0"/>
-              <a:t>13.01.2023</a:t>
+              <a:t>05.02.2024</a:t>
             </a:fld>
             <a:endParaRPr lang="de-DE"/>
           </a:p>
@@ -1439,7 +1439,7 @@
           <a:p>
             <a:fld id="{8FB60A0F-5ED1-45ED-A5D5-DB038E6B70D9}" type="datetimeFigureOut">
               <a:rPr lang="de-DE" smtClean="0"/>
-              <a:t>13.01.2023</a:t>
+              <a:t>05.02.2024</a:t>
             </a:fld>
             <a:endParaRPr lang="de-DE"/>
           </a:p>
@@ -1851,7 +1851,7 @@
           <a:p>
             <a:fld id="{8FB60A0F-5ED1-45ED-A5D5-DB038E6B70D9}" type="datetimeFigureOut">
               <a:rPr lang="de-DE" smtClean="0"/>
-              <a:t>13.01.2023</a:t>
+              <a:t>05.02.2024</a:t>
             </a:fld>
             <a:endParaRPr lang="de-DE"/>
           </a:p>
@@ -1992,7 +1992,7 @@
           <a:p>
             <a:fld id="{8FB60A0F-5ED1-45ED-A5D5-DB038E6B70D9}" type="datetimeFigureOut">
               <a:rPr lang="de-DE" smtClean="0"/>
-              <a:t>13.01.2023</a:t>
+              <a:t>05.02.2024</a:t>
             </a:fld>
             <a:endParaRPr lang="de-DE"/>
           </a:p>
@@ -2105,7 +2105,7 @@
           <a:p>
             <a:fld id="{8FB60A0F-5ED1-45ED-A5D5-DB038E6B70D9}" type="datetimeFigureOut">
               <a:rPr lang="de-DE" smtClean="0"/>
-              <a:t>13.01.2023</a:t>
+              <a:t>05.02.2024</a:t>
             </a:fld>
             <a:endParaRPr lang="de-DE"/>
           </a:p>
@@ -2416,7 +2416,7 @@
           <a:p>
             <a:fld id="{8FB60A0F-5ED1-45ED-A5D5-DB038E6B70D9}" type="datetimeFigureOut">
               <a:rPr lang="de-DE" smtClean="0"/>
-              <a:t>13.01.2023</a:t>
+              <a:t>05.02.2024</a:t>
             </a:fld>
             <a:endParaRPr lang="de-DE"/>
           </a:p>
@@ -2704,7 +2704,7 @@
           <a:p>
             <a:fld id="{8FB60A0F-5ED1-45ED-A5D5-DB038E6B70D9}" type="datetimeFigureOut">
               <a:rPr lang="de-DE" smtClean="0"/>
-              <a:t>13.01.2023</a:t>
+              <a:t>05.02.2024</a:t>
             </a:fld>
             <a:endParaRPr lang="de-DE"/>
           </a:p>
@@ -2945,7 +2945,7 @@
           <a:p>
             <a:fld id="{8FB60A0F-5ED1-45ED-A5D5-DB038E6B70D9}" type="datetimeFigureOut">
               <a:rPr lang="de-DE" smtClean="0"/>
-              <a:t>13.01.2023</a:t>
+              <a:t>05.02.2024</a:t>
             </a:fld>
             <a:endParaRPr lang="de-DE"/>
           </a:p>
@@ -3074,6 +3074,42 @@
           <a:xfrm>
             <a:off x="240268" y="6356350"/>
             <a:ext cx="369332" cy="369332"/>
+          </a:xfrm>
+          <a:prstGeom prst="rect">
+            <a:avLst/>
+          </a:prstGeom>
+        </p:spPr>
+      </p:pic>
+      <p:pic>
+        <p:nvPicPr>
+          <p:cNvPr id="8" name="masterImagePNG">
+            <a:extLst>
+              <a:ext uri="{FF2B5EF4-FFF2-40B4-BE49-F238E27FC236}">
+                <a16:creationId xmlns:a16="http://schemas.microsoft.com/office/drawing/2014/main" id="{94F5BD0B-146F-4561-8BC8-946F1098E289}"/>
+              </a:ext>
+            </a:extLst>
+          </p:cNvPr>
+          <p:cNvPicPr>
+            <a:picLocks noChangeAspect="1"/>
+          </p:cNvPicPr>
+          <p:nvPr userDrawn="1"/>
+        </p:nvPicPr>
+        <p:blipFill>
+          <a:blip r:embed="rId15">
+            <a:extLst>
+              <a:ext uri="{28A0092B-C50C-407E-A947-70E740481C1C}">
+                <a14:useLocalDpi xmlns:a14="http://schemas.microsoft.com/office/drawing/2010/main" val="0"/>
+              </a:ext>
+            </a:extLst>
+          </a:blip>
+          <a:stretch>
+            <a:fillRect/>
+          </a:stretch>
+        </p:blipFill>
+        <p:spPr>
+          <a:xfrm>
+            <a:off x="0" y="9525"/>
+            <a:ext cx="369333" cy="1681163"/>
           </a:xfrm>
           <a:prstGeom prst="rect">
             <a:avLst/>

</xml_diff>